<commit_message>
Add Description about java installation on Mac OS X (Lion) [#14399999]
</commit_message>
<xml_diff>
--- a/docs/Brainliner_Desktop_Tutorial_for_Use[jp].pptx
+++ b/docs/Brainliner_Desktop_Tutorial_for_Use[jp].pptx
@@ -395,7 +395,7 @@
           <a:bodyPr bIns="0" lIns="0" rIns="0" tIns="0" wrap="none"/>
           <a:p>
             <a:pPr algn="r"/>
-            <a:fld id="{01F1F1D1-A191-41E1-A1F1-71B1E11161D1}" type="slidenum">
+            <a:fld id="{71E1C1F1-0151-4171-9101-3111C171C1C1}" type="slidenum">
               <a:rPr lang="fi-FI" sz="1400"/>
               <a:t>&lt;番号&gt;</a:t>
             </a:fld>
@@ -1561,7 +1561,71 @@
                   <a:srgbClr val="000000"/>
                 </a:solidFill>
               </a:rPr>
-              <a:t>Software : Java 1.6.x</a:t>
+              <a:t>Software : Java 1.6.x </a:t>
+            </a:r>
+            <a:r>
+              <a:rPr lang="fi-FI" sz="1400">
+                <a:solidFill>
+                  <a:srgbClr val="ff420e"/>
+                </a:solidFill>
+              </a:rPr>
+              <a:t>Mac OS X (Lion)</a:t>
+            </a:r>
+            <a:r>
+              <a:rPr lang="fi-FI" sz="1400">
+                <a:solidFill>
+                  <a:srgbClr val="ff420e"/>
+                </a:solidFill>
+              </a:rPr>
+              <a:t>をお使いの方は</a:t>
+            </a:r>
+            <a:r>
+              <a:rPr lang="fi-FI" sz="1400">
+                <a:solidFill>
+                  <a:srgbClr val="ff420e"/>
+                </a:solidFill>
+              </a:rPr>
+              <a:t>java</a:t>
+            </a:r>
+            <a:r>
+              <a:rPr lang="fi-FI" sz="1400">
+                <a:solidFill>
+                  <a:srgbClr val="ff420e"/>
+                </a:solidFill>
+              </a:rPr>
+              <a:t>のインストールが必要です。ターミナルを起動し、</a:t>
+            </a:r>
+            <a:r>
+              <a:rPr lang="fi-FI" sz="1400">
+                <a:solidFill>
+                  <a:srgbClr val="ff420e"/>
+                </a:solidFill>
+              </a:rPr>
+              <a:t>java</a:t>
+            </a:r>
+            <a:r>
+              <a:rPr lang="fi-FI" sz="1400">
+                <a:solidFill>
+                  <a:srgbClr val="ff420e"/>
+                </a:solidFill>
+              </a:rPr>
+              <a:t>と入力することで、</a:t>
+            </a:r>
+            <a:r>
+              <a:rPr lang="fi-FI" sz="1400">
+                <a:solidFill>
+                  <a:srgbClr val="ff420e"/>
+                </a:solidFill>
+              </a:rPr>
+              <a:t>java</a:t>
+            </a:r>
+            <a:r>
+              <a:rPr lang="fi-FI" sz="1400">
+                <a:solidFill>
+                  <a:srgbClr val="ff420e"/>
+                </a:solidFill>
+              </a:rPr>
+              <a:t>をインストールしてください。</a:t>
             </a:r>
             <a:endParaRPr/>
           </a:p>

</xml_diff>